<commit_message>
korean git branch pptx
</commit_message>
<xml_diff>
--- a/week12/branch.pptx
+++ b/week12/branch.pptx
@@ -3575,8 +3575,16 @@
           <a:p>
             <a:pPr algn="l"/>
             <a:r>
+              <a:rPr lang="ko-KR" altLang="en-US" sz="11500" dirty="0"/>
+              <a:t>깃 </a:t>
+            </a:r>
+            <a:r>
+              <a:rPr lang="ko-KR" altLang="en-US" sz="11500" dirty="0" err="1"/>
+              <a:t>브랜치</a:t>
+            </a:r>
+            <a:r>
               <a:rPr lang="en-US" altLang="ko-KR" sz="11500" dirty="0"/>
-              <a:t>Git Branch</a:t>
+              <a:t>(Git Branch)</a:t>
             </a:r>
             <a:endParaRPr lang="en-KR" sz="11500" dirty="0"/>
           </a:p>
@@ -3682,9 +3690,22 @@
           <a:lstStyle/>
           <a:p>
             <a:r>
+              <a:rPr lang="ko-KR" altLang="en-US" sz="3600" dirty="0" err="1"/>
+              <a:t>브랜치</a:t>
+            </a:r>
+            <a:r>
+              <a:rPr lang="en-US" altLang="ko-KR" sz="3600" dirty="0"/>
+              <a:t>(</a:t>
+            </a:r>
+            <a:r>
               <a:rPr lang="en-KR" sz="3600" dirty="0"/>
               <a:t>Branch</a:t>
             </a:r>
+            <a:r>
+              <a:rPr lang="en-US" altLang="ko-KR" sz="3600" dirty="0"/>
+              <a:t>)</a:t>
+            </a:r>
+            <a:endParaRPr lang="en-KR" sz="3600" dirty="0"/>
           </a:p>
         </p:txBody>
       </p:sp>
@@ -3747,21 +3768,24 @@
           <a:lstStyle/>
           <a:p>
             <a:r>
-              <a:rPr lang="en-US" altLang="ko-KR" sz="1800" dirty="0"/>
-              <a:t>An independent workspace</a:t>
-            </a:r>
-          </a:p>
-          <a:p>
-            <a:r>
-              <a:rPr lang="en-US" altLang="ko-KR" sz="1800" dirty="0"/>
-              <a:t>Comparable to a cooking lab located in a corner of a kitchen in a restaurant</a:t>
-            </a:r>
-          </a:p>
-          <a:p>
-            <a:r>
-              <a:rPr lang="en-US" altLang="ko-KR" sz="1800" dirty="0"/>
-              <a:t>It is possible to embark on new development while maintaining the content of the work currently in progress</a:t>
-            </a:r>
+              <a:rPr lang="ko-KR" altLang="en-US" sz="1600" dirty="0"/>
+              <a:t>독립된 작업 공간</a:t>
+            </a:r>
+            <a:endParaRPr lang="en-US" altLang="ko-KR" sz="1600" dirty="0"/>
+          </a:p>
+          <a:p>
+            <a:r>
+              <a:rPr lang="ko-KR" altLang="en-US" sz="1600" dirty="0"/>
+              <a:t>식당에 비유하면 주방 한 켠에 있는 조리실험실 같은 공간</a:t>
+            </a:r>
+            <a:endParaRPr lang="en-US" altLang="ko-KR" sz="1600" dirty="0"/>
+          </a:p>
+          <a:p>
+            <a:r>
+              <a:rPr lang="ko-KR" altLang="en-US" sz="1600" dirty="0"/>
+              <a:t>지금 작업하던 내용을 그대로 유지한채 새로운 개발이 가능</a:t>
+            </a:r>
+            <a:endParaRPr lang="en-US" altLang="ko-KR" sz="1600" dirty="0"/>
           </a:p>
         </p:txBody>
       </p:sp>

</xml_diff>

<commit_message>
english version of pptx
</commit_message>
<xml_diff>
--- a/week12/branch.pptx
+++ b/week12/branch.pptx
@@ -3575,16 +3575,8 @@
           <a:p>
             <a:pPr algn="l"/>
             <a:r>
-              <a:rPr lang="ko-KR" altLang="en-US" sz="11500" dirty="0"/>
-              <a:t>깃 </a:t>
-            </a:r>
-            <a:r>
-              <a:rPr lang="ko-KR" altLang="en-US" sz="11500" dirty="0" err="1"/>
-              <a:t>브랜치</a:t>
-            </a:r>
-            <a:r>
               <a:rPr lang="en-US" altLang="ko-KR" sz="11500" dirty="0"/>
-              <a:t>(Git Branch)</a:t>
+              <a:t>Git Branch</a:t>
             </a:r>
             <a:endParaRPr lang="en-KR" sz="11500" dirty="0"/>
           </a:p>
@@ -3690,22 +3682,9 @@
           <a:lstStyle/>
           <a:p>
             <a:r>
-              <a:rPr lang="ko-KR" altLang="en-US" sz="3600" dirty="0" err="1"/>
-              <a:t>브랜치</a:t>
-            </a:r>
-            <a:r>
-              <a:rPr lang="en-US" altLang="ko-KR" sz="3600" dirty="0"/>
-              <a:t>(</a:t>
-            </a:r>
-            <a:r>
               <a:rPr lang="en-KR" sz="3600" dirty="0"/>
               <a:t>Branch</a:t>
             </a:r>
-            <a:r>
-              <a:rPr lang="en-US" altLang="ko-KR" sz="3600" dirty="0"/>
-              <a:t>)</a:t>
-            </a:r>
-            <a:endParaRPr lang="en-KR" sz="3600" dirty="0"/>
           </a:p>
         </p:txBody>
       </p:sp>
@@ -3768,24 +3747,21 @@
           <a:lstStyle/>
           <a:p>
             <a:r>
-              <a:rPr lang="ko-KR" altLang="en-US" sz="1600" dirty="0"/>
-              <a:t>독립된 작업 공간</a:t>
-            </a:r>
-            <a:endParaRPr lang="en-US" altLang="ko-KR" sz="1600" dirty="0"/>
-          </a:p>
-          <a:p>
-            <a:r>
-              <a:rPr lang="ko-KR" altLang="en-US" sz="1600" dirty="0"/>
-              <a:t>식당에 비유하면 주방 한 켠에 있는 조리실험실 같은 공간</a:t>
-            </a:r>
-            <a:endParaRPr lang="en-US" altLang="ko-KR" sz="1600" dirty="0"/>
-          </a:p>
-          <a:p>
-            <a:r>
-              <a:rPr lang="ko-KR" altLang="en-US" sz="1600" dirty="0"/>
-              <a:t>지금 작업하던 내용을 그대로 유지한채 새로운 개발이 가능</a:t>
-            </a:r>
-            <a:endParaRPr lang="en-US" altLang="ko-KR" sz="1600" dirty="0"/>
+              <a:rPr lang="en-US" altLang="ko-KR" sz="1800" dirty="0"/>
+              <a:t>An independent workspace</a:t>
+            </a:r>
+          </a:p>
+          <a:p>
+            <a:r>
+              <a:rPr lang="en-US" altLang="ko-KR" sz="1800" dirty="0"/>
+              <a:t>Comparable to a cooking lab located in a corner of a kitchen in a restaurant</a:t>
+            </a:r>
+          </a:p>
+          <a:p>
+            <a:r>
+              <a:rPr lang="en-US" altLang="ko-KR" sz="1800" dirty="0"/>
+              <a:t>It is possible to embark on new development while maintaining the content of the work currently in progress</a:t>
+            </a:r>
           </a:p>
         </p:txBody>
       </p:sp>

</xml_diff>

<commit_message>
add thank you branch
</commit_message>
<xml_diff>
--- a/week12/branch.pptx
+++ b/week12/branch.pptx
@@ -7,6 +7,7 @@
   <p:sldIdLst>
     <p:sldId id="256" r:id="rId2"/>
     <p:sldId id="257" r:id="rId3"/>
+    <p:sldId id="258" r:id="rId4"/>
   </p:sldIdLst>
   <p:sldSz cx="12192000" cy="6858000"/>
   <p:notesSz cx="6858000" cy="9144000"/>
@@ -262,7 +263,7 @@
           <a:p>
             <a:fld id="{42AB81E2-2E7B-B344-9159-A676E4F74E42}" type="datetimeFigureOut">
               <a:rPr lang="en-KR" smtClean="0"/>
-              <a:t>11/16/23</a:t>
+              <a:t>11/17/2023</a:t>
             </a:fld>
             <a:endParaRPr lang="en-KR"/>
           </a:p>
@@ -462,7 +463,7 @@
           <a:p>
             <a:fld id="{42AB81E2-2E7B-B344-9159-A676E4F74E42}" type="datetimeFigureOut">
               <a:rPr lang="en-KR" smtClean="0"/>
-              <a:t>11/16/23</a:t>
+              <a:t>11/17/2023</a:t>
             </a:fld>
             <a:endParaRPr lang="en-KR"/>
           </a:p>
@@ -672,7 +673,7 @@
           <a:p>
             <a:fld id="{42AB81E2-2E7B-B344-9159-A676E4F74E42}" type="datetimeFigureOut">
               <a:rPr lang="en-KR" smtClean="0"/>
-              <a:t>11/16/23</a:t>
+              <a:t>11/17/2023</a:t>
             </a:fld>
             <a:endParaRPr lang="en-KR"/>
           </a:p>
@@ -872,7 +873,7 @@
           <a:p>
             <a:fld id="{42AB81E2-2E7B-B344-9159-A676E4F74E42}" type="datetimeFigureOut">
               <a:rPr lang="en-KR" smtClean="0"/>
-              <a:t>11/16/23</a:t>
+              <a:t>11/17/2023</a:t>
             </a:fld>
             <a:endParaRPr lang="en-KR"/>
           </a:p>
@@ -1148,7 +1149,7 @@
           <a:p>
             <a:fld id="{42AB81E2-2E7B-B344-9159-A676E4F74E42}" type="datetimeFigureOut">
               <a:rPr lang="en-KR" smtClean="0"/>
-              <a:t>11/16/23</a:t>
+              <a:t>11/17/2023</a:t>
             </a:fld>
             <a:endParaRPr lang="en-KR"/>
           </a:p>
@@ -1416,7 +1417,7 @@
           <a:p>
             <a:fld id="{42AB81E2-2E7B-B344-9159-A676E4F74E42}" type="datetimeFigureOut">
               <a:rPr lang="en-KR" smtClean="0"/>
-              <a:t>11/16/23</a:t>
+              <a:t>11/17/2023</a:t>
             </a:fld>
             <a:endParaRPr lang="en-KR"/>
           </a:p>
@@ -1831,7 +1832,7 @@
           <a:p>
             <a:fld id="{42AB81E2-2E7B-B344-9159-A676E4F74E42}" type="datetimeFigureOut">
               <a:rPr lang="en-KR" smtClean="0"/>
-              <a:t>11/16/23</a:t>
+              <a:t>11/17/2023</a:t>
             </a:fld>
             <a:endParaRPr lang="en-KR"/>
           </a:p>
@@ -1973,7 +1974,7 @@
           <a:p>
             <a:fld id="{42AB81E2-2E7B-B344-9159-A676E4F74E42}" type="datetimeFigureOut">
               <a:rPr lang="en-KR" smtClean="0"/>
-              <a:t>11/16/23</a:t>
+              <a:t>11/17/2023</a:t>
             </a:fld>
             <a:endParaRPr lang="en-KR"/>
           </a:p>
@@ -2086,7 +2087,7 @@
           <a:p>
             <a:fld id="{42AB81E2-2E7B-B344-9159-A676E4F74E42}" type="datetimeFigureOut">
               <a:rPr lang="en-KR" smtClean="0"/>
-              <a:t>11/16/23</a:t>
+              <a:t>11/17/2023</a:t>
             </a:fld>
             <a:endParaRPr lang="en-KR"/>
           </a:p>
@@ -2399,7 +2400,7 @@
           <a:p>
             <a:fld id="{42AB81E2-2E7B-B344-9159-A676E4F74E42}" type="datetimeFigureOut">
               <a:rPr lang="en-KR" smtClean="0"/>
-              <a:t>11/16/23</a:t>
+              <a:t>11/17/2023</a:t>
             </a:fld>
             <a:endParaRPr lang="en-KR"/>
           </a:p>
@@ -2688,7 +2689,7 @@
           <a:p>
             <a:fld id="{42AB81E2-2E7B-B344-9159-A676E4F74E42}" type="datetimeFigureOut">
               <a:rPr lang="en-KR" smtClean="0"/>
-              <a:t>11/16/23</a:t>
+              <a:t>11/17/2023</a:t>
             </a:fld>
             <a:endParaRPr lang="en-KR"/>
           </a:p>
@@ -2931,7 +2932,7 @@
           <a:p>
             <a:fld id="{42AB81E2-2E7B-B344-9159-A676E4F74E42}" type="datetimeFigureOut">
               <a:rPr lang="en-KR" smtClean="0"/>
-              <a:t>11/16/23</a:t>
+              <a:t>11/17/2023</a:t>
             </a:fld>
             <a:endParaRPr lang="en-KR"/>
           </a:p>
@@ -3802,6 +3803,72 @@
 </p:sld>
 </file>
 
+<file path=ppt/slides/slide3.xml><?xml version="1.0" encoding="utf-8"?>
+<p:sld xmlns:a="http://schemas.openxmlformats.org/drawingml/2006/main" xmlns:r="http://schemas.openxmlformats.org/officeDocument/2006/relationships" xmlns:p="http://schemas.openxmlformats.org/presentationml/2006/main">
+  <p:cSld>
+    <p:spTree>
+      <p:nvGrpSpPr>
+        <p:cNvPr id="1" name=""/>
+        <p:cNvGrpSpPr/>
+        <p:nvPr/>
+      </p:nvGrpSpPr>
+      <p:grpSpPr>
+        <a:xfrm>
+          <a:off x="0" y="0"/>
+          <a:ext cx="0" cy="0"/>
+          <a:chOff x="0" y="0"/>
+          <a:chExt cx="0" cy="0"/>
+        </a:xfrm>
+      </p:grpSpPr>
+      <p:sp>
+        <p:nvSpPr>
+          <p:cNvPr id="6" name="TextBox 5">
+            <a:extLst>
+              <a:ext uri="{FF2B5EF4-FFF2-40B4-BE49-F238E27FC236}">
+                <a16:creationId xmlns:a16="http://schemas.microsoft.com/office/drawing/2014/main" id="{98649723-72CE-430B-BCCC-259749BF9042}"/>
+              </a:ext>
+            </a:extLst>
+          </p:cNvPr>
+          <p:cNvSpPr txBox="1"/>
+          <p:nvPr/>
+        </p:nvSpPr>
+        <p:spPr>
+          <a:xfrm>
+            <a:off x="3916680" y="2569755"/>
+            <a:ext cx="4057906" cy="1200329"/>
+          </a:xfrm>
+          <a:prstGeom prst="rect">
+            <a:avLst/>
+          </a:prstGeom>
+          <a:noFill/>
+        </p:spPr>
+        <p:txBody>
+          <a:bodyPr wrap="none" rtlCol="0">
+            <a:spAutoFit/>
+          </a:bodyPr>
+          <a:lstStyle/>
+          <a:p>
+            <a:r>
+              <a:rPr lang="en-US" altLang="ko-KR" sz="7200" dirty="0"/>
+              <a:t>Thank you</a:t>
+            </a:r>
+            <a:endParaRPr lang="ko-KR" altLang="en-US" sz="7200" dirty="0"/>
+          </a:p>
+        </p:txBody>
+      </p:sp>
+    </p:spTree>
+    <p:extLst>
+      <p:ext uri="{BB962C8B-B14F-4D97-AF65-F5344CB8AC3E}">
+        <p14:creationId xmlns:p14="http://schemas.microsoft.com/office/powerpoint/2010/main" val="1999388311"/>
+      </p:ext>
+    </p:extLst>
+  </p:cSld>
+  <p:clrMapOvr>
+    <a:masterClrMapping/>
+  </p:clrMapOvr>
+</p:sld>
+</file>
+
 <file path=ppt/theme/theme1.xml><?xml version="1.0" encoding="utf-8"?>
 <a:theme xmlns:a="http://schemas.openxmlformats.org/drawingml/2006/main" name="Office Theme">
   <a:themeElements>

</xml_diff>

<commit_message>
add thank you slide !!!
</commit_message>
<xml_diff>
--- a/week12/branch.pptx
+++ b/week12/branch.pptx
@@ -7,6 +7,7 @@
   <p:sldIdLst>
     <p:sldId id="256" r:id="rId2"/>
     <p:sldId id="257" r:id="rId3"/>
+    <p:sldId id="258" r:id="rId4"/>
   </p:sldIdLst>
   <p:sldSz cx="12192000" cy="6858000"/>
   <p:notesSz cx="6858000" cy="9144000"/>
@@ -262,7 +263,7 @@
           <a:p>
             <a:fld id="{42AB81E2-2E7B-B344-9159-A676E4F74E42}" type="datetimeFigureOut">
               <a:rPr lang="en-KR" smtClean="0"/>
-              <a:t>11/16/23</a:t>
+              <a:t>11/17/23</a:t>
             </a:fld>
             <a:endParaRPr lang="en-KR"/>
           </a:p>
@@ -462,7 +463,7 @@
           <a:p>
             <a:fld id="{42AB81E2-2E7B-B344-9159-A676E4F74E42}" type="datetimeFigureOut">
               <a:rPr lang="en-KR" smtClean="0"/>
-              <a:t>11/16/23</a:t>
+              <a:t>11/17/23</a:t>
             </a:fld>
             <a:endParaRPr lang="en-KR"/>
           </a:p>
@@ -672,7 +673,7 @@
           <a:p>
             <a:fld id="{42AB81E2-2E7B-B344-9159-A676E4F74E42}" type="datetimeFigureOut">
               <a:rPr lang="en-KR" smtClean="0"/>
-              <a:t>11/16/23</a:t>
+              <a:t>11/17/23</a:t>
             </a:fld>
             <a:endParaRPr lang="en-KR"/>
           </a:p>
@@ -872,7 +873,7 @@
           <a:p>
             <a:fld id="{42AB81E2-2E7B-B344-9159-A676E4F74E42}" type="datetimeFigureOut">
               <a:rPr lang="en-KR" smtClean="0"/>
-              <a:t>11/16/23</a:t>
+              <a:t>11/17/23</a:t>
             </a:fld>
             <a:endParaRPr lang="en-KR"/>
           </a:p>
@@ -1148,7 +1149,7 @@
           <a:p>
             <a:fld id="{42AB81E2-2E7B-B344-9159-A676E4F74E42}" type="datetimeFigureOut">
               <a:rPr lang="en-KR" smtClean="0"/>
-              <a:t>11/16/23</a:t>
+              <a:t>11/17/23</a:t>
             </a:fld>
             <a:endParaRPr lang="en-KR"/>
           </a:p>
@@ -1416,7 +1417,7 @@
           <a:p>
             <a:fld id="{42AB81E2-2E7B-B344-9159-A676E4F74E42}" type="datetimeFigureOut">
               <a:rPr lang="en-KR" smtClean="0"/>
-              <a:t>11/16/23</a:t>
+              <a:t>11/17/23</a:t>
             </a:fld>
             <a:endParaRPr lang="en-KR"/>
           </a:p>
@@ -1831,7 +1832,7 @@
           <a:p>
             <a:fld id="{42AB81E2-2E7B-B344-9159-A676E4F74E42}" type="datetimeFigureOut">
               <a:rPr lang="en-KR" smtClean="0"/>
-              <a:t>11/16/23</a:t>
+              <a:t>11/17/23</a:t>
             </a:fld>
             <a:endParaRPr lang="en-KR"/>
           </a:p>
@@ -1973,7 +1974,7 @@
           <a:p>
             <a:fld id="{42AB81E2-2E7B-B344-9159-A676E4F74E42}" type="datetimeFigureOut">
               <a:rPr lang="en-KR" smtClean="0"/>
-              <a:t>11/16/23</a:t>
+              <a:t>11/17/23</a:t>
             </a:fld>
             <a:endParaRPr lang="en-KR"/>
           </a:p>
@@ -2086,7 +2087,7 @@
           <a:p>
             <a:fld id="{42AB81E2-2E7B-B344-9159-A676E4F74E42}" type="datetimeFigureOut">
               <a:rPr lang="en-KR" smtClean="0"/>
-              <a:t>11/16/23</a:t>
+              <a:t>11/17/23</a:t>
             </a:fld>
             <a:endParaRPr lang="en-KR"/>
           </a:p>
@@ -2399,7 +2400,7 @@
           <a:p>
             <a:fld id="{42AB81E2-2E7B-B344-9159-A676E4F74E42}" type="datetimeFigureOut">
               <a:rPr lang="en-KR" smtClean="0"/>
-              <a:t>11/16/23</a:t>
+              <a:t>11/17/23</a:t>
             </a:fld>
             <a:endParaRPr lang="en-KR"/>
           </a:p>
@@ -2688,7 +2689,7 @@
           <a:p>
             <a:fld id="{42AB81E2-2E7B-B344-9159-A676E4F74E42}" type="datetimeFigureOut">
               <a:rPr lang="en-KR" smtClean="0"/>
-              <a:t>11/16/23</a:t>
+              <a:t>11/17/23</a:t>
             </a:fld>
             <a:endParaRPr lang="en-KR"/>
           </a:p>
@@ -2931,7 +2932,7 @@
           <a:p>
             <a:fld id="{42AB81E2-2E7B-B344-9159-A676E4F74E42}" type="datetimeFigureOut">
               <a:rPr lang="en-KR" smtClean="0"/>
-              <a:t>11/16/23</a:t>
+              <a:t>11/17/23</a:t>
             </a:fld>
             <a:endParaRPr lang="en-KR"/>
           </a:p>
@@ -3802,6 +3803,71 @@
 </p:sld>
 </file>
 
+<file path=ppt/slides/slide3.xml><?xml version="1.0" encoding="utf-8"?>
+<p:sld xmlns:a="http://schemas.openxmlformats.org/drawingml/2006/main" xmlns:r="http://schemas.openxmlformats.org/officeDocument/2006/relationships" xmlns:p="http://schemas.openxmlformats.org/presentationml/2006/main">
+  <p:cSld>
+    <p:spTree>
+      <p:nvGrpSpPr>
+        <p:cNvPr id="1" name=""/>
+        <p:cNvGrpSpPr/>
+        <p:nvPr/>
+      </p:nvGrpSpPr>
+      <p:grpSpPr>
+        <a:xfrm>
+          <a:off x="0" y="0"/>
+          <a:ext cx="0" cy="0"/>
+          <a:chOff x="0" y="0"/>
+          <a:chExt cx="0" cy="0"/>
+        </a:xfrm>
+      </p:grpSpPr>
+      <p:sp>
+        <p:nvSpPr>
+          <p:cNvPr id="4" name="TextBox 3">
+            <a:extLst>
+              <a:ext uri="{FF2B5EF4-FFF2-40B4-BE49-F238E27FC236}">
+                <a16:creationId xmlns:a16="http://schemas.microsoft.com/office/drawing/2014/main" id="{405DF234-B4D7-635C-95C7-A476EFCAB0BF}"/>
+              </a:ext>
+            </a:extLst>
+          </p:cNvPr>
+          <p:cNvSpPr txBox="1"/>
+          <p:nvPr/>
+        </p:nvSpPr>
+        <p:spPr>
+          <a:xfrm>
+            <a:off x="5225143" y="2928257"/>
+            <a:ext cx="1146852" cy="369332"/>
+          </a:xfrm>
+          <a:prstGeom prst="rect">
+            <a:avLst/>
+          </a:prstGeom>
+          <a:noFill/>
+        </p:spPr>
+        <p:txBody>
+          <a:bodyPr wrap="none" rtlCol="0">
+            <a:spAutoFit/>
+          </a:bodyPr>
+          <a:lstStyle/>
+          <a:p>
+            <a:r>
+              <a:rPr lang="en-KR" dirty="0"/>
+              <a:t>Thank You</a:t>
+            </a:r>
+          </a:p>
+        </p:txBody>
+      </p:sp>
+    </p:spTree>
+    <p:extLst>
+      <p:ext uri="{BB962C8B-B14F-4D97-AF65-F5344CB8AC3E}">
+        <p14:creationId xmlns:p14="http://schemas.microsoft.com/office/powerpoint/2010/main" val="3739343928"/>
+      </p:ext>
+    </p:extLst>
+  </p:cSld>
+  <p:clrMapOvr>
+    <a:masterClrMapping/>
+  </p:clrMapOvr>
+</p:sld>
+</file>
+
 <file path=ppt/theme/theme1.xml><?xml version="1.0" encoding="utf-8"?>
 <a:theme xmlns:a="http://schemas.openxmlformats.org/drawingml/2006/main" name="Office Theme">
   <a:themeElements>

</xml_diff>

<commit_message>
add thank you file
</commit_message>
<xml_diff>
--- a/week12/branch.pptx
+++ b/week12/branch.pptx
@@ -7,6 +7,7 @@
   <p:sldIdLst>
     <p:sldId id="256" r:id="rId2"/>
     <p:sldId id="257" r:id="rId3"/>
+    <p:sldId id="258" r:id="rId4"/>
   </p:sldIdLst>
   <p:sldSz cx="12192000" cy="6858000"/>
   <p:notesSz cx="6858000" cy="9144000"/>
@@ -113,6 +114,35 @@
 </p:presentation>
 </file>
 
+<file path=ppt/changesInfos/changesInfo1.xml><?xml version="1.0" encoding="utf-8"?>
+<pc:chgInfo xmlns:a="http://schemas.openxmlformats.org/drawingml/2006/main" xmlns:r="http://schemas.openxmlformats.org/officeDocument/2006/relationships" xmlns:ac="http://schemas.microsoft.com/office/drawing/2013/main/command" xmlns:pc="http://schemas.microsoft.com/office/powerpoint/2013/main/command">
+  <pc:docChgLst>
+    <pc:chgData name="동수 이" userId="1e0160bb8418f1fe" providerId="LiveId" clId="{F2DEB822-4300-4353-9D20-FEF9B8D57C1B}"/>
+    <pc:docChg chg="addSld modSld">
+      <pc:chgData name="동수 이" userId="1e0160bb8418f1fe" providerId="LiveId" clId="{F2DEB822-4300-4353-9D20-FEF9B8D57C1B}" dt="2023-11-17T15:08:21.963" v="11" actId="20577"/>
+      <pc:docMkLst>
+        <pc:docMk/>
+      </pc:docMkLst>
+      <pc:sldChg chg="modSp new mod">
+        <pc:chgData name="동수 이" userId="1e0160bb8418f1fe" providerId="LiveId" clId="{F2DEB822-4300-4353-9D20-FEF9B8D57C1B}" dt="2023-11-17T15:08:21.963" v="11" actId="20577"/>
+        <pc:sldMkLst>
+          <pc:docMk/>
+          <pc:sldMk cId="2703640662" sldId="258"/>
+        </pc:sldMkLst>
+        <pc:spChg chg="mod">
+          <ac:chgData name="동수 이" userId="1e0160bb8418f1fe" providerId="LiveId" clId="{F2DEB822-4300-4353-9D20-FEF9B8D57C1B}" dt="2023-11-17T15:08:21.963" v="11" actId="20577"/>
+          <ac:spMkLst>
+            <pc:docMk/>
+            <pc:sldMk cId="2703640662" sldId="258"/>
+            <ac:spMk id="2" creationId="{BC60B349-A11B-623B-2CCC-278DDFF21509}"/>
+          </ac:spMkLst>
+        </pc:spChg>
+      </pc:sldChg>
+    </pc:docChg>
+  </pc:docChgLst>
+</pc:chgInfo>
+</file>
+
 <file path=ppt/slideLayouts/slideLayout1.xml><?xml version="1.0" encoding="utf-8"?>
 <p:sldLayout xmlns:a="http://schemas.openxmlformats.org/drawingml/2006/main" xmlns:r="http://schemas.openxmlformats.org/officeDocument/2006/relationships" xmlns:p="http://schemas.openxmlformats.org/presentationml/2006/main" type="title" preserve="1">
   <p:cSld name="Title Slide">
@@ -262,7 +292,7 @@
           <a:p>
             <a:fld id="{42AB81E2-2E7B-B344-9159-A676E4F74E42}" type="datetimeFigureOut">
               <a:rPr lang="en-KR" smtClean="0"/>
-              <a:t>11/16/23</a:t>
+              <a:t>11/18/2023</a:t>
             </a:fld>
             <a:endParaRPr lang="en-KR"/>
           </a:p>
@@ -462,7 +492,7 @@
           <a:p>
             <a:fld id="{42AB81E2-2E7B-B344-9159-A676E4F74E42}" type="datetimeFigureOut">
               <a:rPr lang="en-KR" smtClean="0"/>
-              <a:t>11/16/23</a:t>
+              <a:t>11/18/2023</a:t>
             </a:fld>
             <a:endParaRPr lang="en-KR"/>
           </a:p>
@@ -672,7 +702,7 @@
           <a:p>
             <a:fld id="{42AB81E2-2E7B-B344-9159-A676E4F74E42}" type="datetimeFigureOut">
               <a:rPr lang="en-KR" smtClean="0"/>
-              <a:t>11/16/23</a:t>
+              <a:t>11/18/2023</a:t>
             </a:fld>
             <a:endParaRPr lang="en-KR"/>
           </a:p>
@@ -872,7 +902,7 @@
           <a:p>
             <a:fld id="{42AB81E2-2E7B-B344-9159-A676E4F74E42}" type="datetimeFigureOut">
               <a:rPr lang="en-KR" smtClean="0"/>
-              <a:t>11/16/23</a:t>
+              <a:t>11/18/2023</a:t>
             </a:fld>
             <a:endParaRPr lang="en-KR"/>
           </a:p>
@@ -1148,7 +1178,7 @@
           <a:p>
             <a:fld id="{42AB81E2-2E7B-B344-9159-A676E4F74E42}" type="datetimeFigureOut">
               <a:rPr lang="en-KR" smtClean="0"/>
-              <a:t>11/16/23</a:t>
+              <a:t>11/18/2023</a:t>
             </a:fld>
             <a:endParaRPr lang="en-KR"/>
           </a:p>
@@ -1416,7 +1446,7 @@
           <a:p>
             <a:fld id="{42AB81E2-2E7B-B344-9159-A676E4F74E42}" type="datetimeFigureOut">
               <a:rPr lang="en-KR" smtClean="0"/>
-              <a:t>11/16/23</a:t>
+              <a:t>11/18/2023</a:t>
             </a:fld>
             <a:endParaRPr lang="en-KR"/>
           </a:p>
@@ -1831,7 +1861,7 @@
           <a:p>
             <a:fld id="{42AB81E2-2E7B-B344-9159-A676E4F74E42}" type="datetimeFigureOut">
               <a:rPr lang="en-KR" smtClean="0"/>
-              <a:t>11/16/23</a:t>
+              <a:t>11/18/2023</a:t>
             </a:fld>
             <a:endParaRPr lang="en-KR"/>
           </a:p>
@@ -1973,7 +2003,7 @@
           <a:p>
             <a:fld id="{42AB81E2-2E7B-B344-9159-A676E4F74E42}" type="datetimeFigureOut">
               <a:rPr lang="en-KR" smtClean="0"/>
-              <a:t>11/16/23</a:t>
+              <a:t>11/18/2023</a:t>
             </a:fld>
             <a:endParaRPr lang="en-KR"/>
           </a:p>
@@ -2086,7 +2116,7 @@
           <a:p>
             <a:fld id="{42AB81E2-2E7B-B344-9159-A676E4F74E42}" type="datetimeFigureOut">
               <a:rPr lang="en-KR" smtClean="0"/>
-              <a:t>11/16/23</a:t>
+              <a:t>11/18/2023</a:t>
             </a:fld>
             <a:endParaRPr lang="en-KR"/>
           </a:p>
@@ -2399,7 +2429,7 @@
           <a:p>
             <a:fld id="{42AB81E2-2E7B-B344-9159-A676E4F74E42}" type="datetimeFigureOut">
               <a:rPr lang="en-KR" smtClean="0"/>
-              <a:t>11/16/23</a:t>
+              <a:t>11/18/2023</a:t>
             </a:fld>
             <a:endParaRPr lang="en-KR"/>
           </a:p>
@@ -2688,7 +2718,7 @@
           <a:p>
             <a:fld id="{42AB81E2-2E7B-B344-9159-A676E4F74E42}" type="datetimeFigureOut">
               <a:rPr lang="en-KR" smtClean="0"/>
-              <a:t>11/16/23</a:t>
+              <a:t>11/18/2023</a:t>
             </a:fld>
             <a:endParaRPr lang="en-KR"/>
           </a:p>
@@ -2931,7 +2961,7 @@
           <a:p>
             <a:fld id="{42AB81E2-2E7B-B344-9159-A676E4F74E42}" type="datetimeFigureOut">
               <a:rPr lang="en-KR" smtClean="0"/>
-              <a:t>11/16/23</a:t>
+              <a:t>11/18/2023</a:t>
             </a:fld>
             <a:endParaRPr lang="en-KR"/>
           </a:p>
@@ -3802,6 +3832,90 @@
 </p:sld>
 </file>
 
+<file path=ppt/slides/slide3.xml><?xml version="1.0" encoding="utf-8"?>
+<p:sld xmlns:a="http://schemas.openxmlformats.org/drawingml/2006/main" xmlns:r="http://schemas.openxmlformats.org/officeDocument/2006/relationships" xmlns:p="http://schemas.openxmlformats.org/presentationml/2006/main">
+  <p:cSld>
+    <p:spTree>
+      <p:nvGrpSpPr>
+        <p:cNvPr id="1" name=""/>
+        <p:cNvGrpSpPr/>
+        <p:nvPr/>
+      </p:nvGrpSpPr>
+      <p:grpSpPr>
+        <a:xfrm>
+          <a:off x="0" y="0"/>
+          <a:ext cx="0" cy="0"/>
+          <a:chOff x="0" y="0"/>
+          <a:chExt cx="0" cy="0"/>
+        </a:xfrm>
+      </p:grpSpPr>
+      <p:sp>
+        <p:nvSpPr>
+          <p:cNvPr id="2" name="제목 1">
+            <a:extLst>
+              <a:ext uri="{FF2B5EF4-FFF2-40B4-BE49-F238E27FC236}">
+                <a16:creationId xmlns:a16="http://schemas.microsoft.com/office/drawing/2014/main" id="{BC60B349-A11B-623B-2CCC-278DDFF21509}"/>
+              </a:ext>
+            </a:extLst>
+          </p:cNvPr>
+          <p:cNvSpPr>
+            <a:spLocks noGrp="1"/>
+          </p:cNvSpPr>
+          <p:nvPr>
+            <p:ph type="title"/>
+          </p:nvPr>
+        </p:nvSpPr>
+        <p:spPr/>
+        <p:txBody>
+          <a:bodyPr/>
+          <a:lstStyle/>
+          <a:p>
+            <a:r>
+              <a:rPr lang="en-US" altLang="ko-KR"/>
+              <a:t>Thank you</a:t>
+            </a:r>
+            <a:endParaRPr lang="ko-KR" altLang="en-US"/>
+          </a:p>
+        </p:txBody>
+      </p:sp>
+      <p:sp>
+        <p:nvSpPr>
+          <p:cNvPr id="3" name="내용 개체 틀 2">
+            <a:extLst>
+              <a:ext uri="{FF2B5EF4-FFF2-40B4-BE49-F238E27FC236}">
+                <a16:creationId xmlns:a16="http://schemas.microsoft.com/office/drawing/2014/main" id="{DFC7BD81-A3BE-C8A0-BB17-B82016DD2C3C}"/>
+              </a:ext>
+            </a:extLst>
+          </p:cNvPr>
+          <p:cNvSpPr>
+            <a:spLocks noGrp="1"/>
+          </p:cNvSpPr>
+          <p:nvPr>
+            <p:ph idx="1"/>
+          </p:nvPr>
+        </p:nvSpPr>
+        <p:spPr/>
+        <p:txBody>
+          <a:bodyPr/>
+          <a:lstStyle/>
+          <a:p>
+            <a:endParaRPr lang="ko-KR" altLang="en-US"/>
+          </a:p>
+        </p:txBody>
+      </p:sp>
+    </p:spTree>
+    <p:extLst>
+      <p:ext uri="{BB962C8B-B14F-4D97-AF65-F5344CB8AC3E}">
+        <p14:creationId xmlns:p14="http://schemas.microsoft.com/office/powerpoint/2010/main" val="2703640662"/>
+      </p:ext>
+    </p:extLst>
+  </p:cSld>
+  <p:clrMapOvr>
+    <a:masterClrMapping/>
+  </p:clrMapOvr>
+</p:sld>
+</file>
+
 <file path=ppt/theme/theme1.xml><?xml version="1.0" encoding="utf-8"?>
 <a:theme xmlns:a="http://schemas.openxmlformats.org/drawingml/2006/main" name="Office Theme">
   <a:themeElements>

</xml_diff>

<commit_message>
add thak you slide
</commit_message>
<xml_diff>
--- a/week12/branch.pptx
+++ b/week12/branch.pptx
@@ -118,13 +118,13 @@
 <pc:chgInfo xmlns:a="http://schemas.openxmlformats.org/drawingml/2006/main" xmlns:r="http://schemas.openxmlformats.org/officeDocument/2006/relationships" xmlns:ac="http://schemas.microsoft.com/office/drawing/2013/main/command" xmlns:pc="http://schemas.microsoft.com/office/powerpoint/2013/main/command">
   <pc:docChgLst>
     <pc:chgData name="동수 이" userId="1e0160bb8418f1fe" providerId="LiveId" clId="{F2DEB822-4300-4353-9D20-FEF9B8D57C1B}"/>
-    <pc:docChg chg="addSld modSld">
-      <pc:chgData name="동수 이" userId="1e0160bb8418f1fe" providerId="LiveId" clId="{F2DEB822-4300-4353-9D20-FEF9B8D57C1B}" dt="2023-11-17T15:08:21.963" v="11" actId="20577"/>
+    <pc:docChg chg="custSel addSld modSld">
+      <pc:chgData name="동수 이" userId="1e0160bb8418f1fe" providerId="LiveId" clId="{F2DEB822-4300-4353-9D20-FEF9B8D57C1B}" dt="2023-11-17T15:28:45.652" v="13" actId="478"/>
       <pc:docMkLst>
         <pc:docMk/>
       </pc:docMkLst>
-      <pc:sldChg chg="modSp new mod">
-        <pc:chgData name="동수 이" userId="1e0160bb8418f1fe" providerId="LiveId" clId="{F2DEB822-4300-4353-9D20-FEF9B8D57C1B}" dt="2023-11-17T15:08:21.963" v="11" actId="20577"/>
+      <pc:sldChg chg="delSp modSp new mod">
+        <pc:chgData name="동수 이" userId="1e0160bb8418f1fe" providerId="LiveId" clId="{F2DEB822-4300-4353-9D20-FEF9B8D57C1B}" dt="2023-11-17T15:28:45.652" v="13" actId="478"/>
         <pc:sldMkLst>
           <pc:docMk/>
           <pc:sldMk cId="2703640662" sldId="258"/>
@@ -135,6 +135,14 @@
             <pc:docMk/>
             <pc:sldMk cId="2703640662" sldId="258"/>
             <ac:spMk id="2" creationId="{BC60B349-A11B-623B-2CCC-278DDFF21509}"/>
+          </ac:spMkLst>
+        </pc:spChg>
+        <pc:spChg chg="del mod">
+          <ac:chgData name="동수 이" userId="1e0160bb8418f1fe" providerId="LiveId" clId="{F2DEB822-4300-4353-9D20-FEF9B8D57C1B}" dt="2023-11-17T15:28:45.652" v="13" actId="478"/>
+          <ac:spMkLst>
+            <pc:docMk/>
+            <pc:sldMk cId="2703640662" sldId="258"/>
+            <ac:spMk id="3" creationId="{DFC7BD81-A3BE-C8A0-BB17-B82016DD2C3C}"/>
           </ac:spMkLst>
         </pc:spChg>
       </pc:sldChg>
@@ -3871,35 +3879,10 @@
           <a:lstStyle/>
           <a:p>
             <a:r>
-              <a:rPr lang="en-US" altLang="ko-KR"/>
+              <a:rPr lang="en-US" altLang="ko-KR" dirty="0"/>
               <a:t>Thank you</a:t>
             </a:r>
-            <a:endParaRPr lang="ko-KR" altLang="en-US"/>
-          </a:p>
-        </p:txBody>
-      </p:sp>
-      <p:sp>
-        <p:nvSpPr>
-          <p:cNvPr id="3" name="내용 개체 틀 2">
-            <a:extLst>
-              <a:ext uri="{FF2B5EF4-FFF2-40B4-BE49-F238E27FC236}">
-                <a16:creationId xmlns:a16="http://schemas.microsoft.com/office/drawing/2014/main" id="{DFC7BD81-A3BE-C8A0-BB17-B82016DD2C3C}"/>
-              </a:ext>
-            </a:extLst>
-          </p:cNvPr>
-          <p:cNvSpPr>
-            <a:spLocks noGrp="1"/>
-          </p:cNvSpPr>
-          <p:nvPr>
-            <p:ph idx="1"/>
-          </p:nvPr>
-        </p:nvSpPr>
-        <p:spPr/>
-        <p:txBody>
-          <a:bodyPr/>
-          <a:lstStyle/>
-          <a:p>
-            <a:endParaRPr lang="ko-KR" altLang="en-US"/>
+            <a:endParaRPr lang="ko-KR" altLang="en-US" dirty="0"/>
           </a:p>
         </p:txBody>
       </p:sp>

</xml_diff>